<commit_message>
add who's doing what in pres
</commit_message>
<xml_diff>
--- a/presentation_izzy_baby.pptx
+++ b/presentation_izzy_baby.pptx
@@ -2125,7 +2125,7 @@
         </p:nvSpPr>
         <p:spPr>
           <a:xfrm>
-            <a:off x="381300" y="685800"/>
+            <a:off x="381000" y="685800"/>
             <a:ext cx="6096000" cy="3429000"/>
           </a:xfrm>
           <a:custGeom>
@@ -8244,6 +8244,41 @@
           </a:p>
         </p:txBody>
       </p:sp>
+      <p:sp>
+        <p:nvSpPr>
+          <p:cNvPr id="2" name="ZoneTexte 1">
+            <a:extLst>
+              <a:ext uri="{FF2B5EF4-FFF2-40B4-BE49-F238E27FC236}">
+                <a16:creationId xmlns:a16="http://schemas.microsoft.com/office/drawing/2014/main" id="{600A0316-B59D-4F50-B280-411F464DA99A}"/>
+              </a:ext>
+            </a:extLst>
+          </p:cNvPr>
+          <p:cNvSpPr txBox="1"/>
+          <p:nvPr/>
+        </p:nvSpPr>
+        <p:spPr>
+          <a:xfrm>
+            <a:off x="2844800" y="3118338"/>
+            <a:ext cx="990977" cy="307777"/>
+          </a:xfrm>
+          <a:prstGeom prst="rect">
+            <a:avLst/>
+          </a:prstGeom>
+          <a:noFill/>
+        </p:spPr>
+        <p:txBody>
+          <a:bodyPr wrap="none" rtlCol="0">
+            <a:spAutoFit/>
+          </a:bodyPr>
+          <a:lstStyle/>
+          <a:p>
+            <a:r>
+              <a:rPr lang="fr-FR" dirty="0"/>
+              <a:t>Amandine</a:t>
+            </a:r>
+          </a:p>
+        </p:txBody>
+      </p:sp>
     </p:spTree>
   </p:cSld>
   <p:clrMapOvr>
@@ -8354,6 +8389,41 @@
               <a:t>ivedata+observer +asynctask</a:t>
             </a:r>
             <a:endParaRPr dirty="0"/>
+          </a:p>
+        </p:txBody>
+      </p:sp>
+      <p:sp>
+        <p:nvSpPr>
+          <p:cNvPr id="2" name="ZoneTexte 1">
+            <a:extLst>
+              <a:ext uri="{FF2B5EF4-FFF2-40B4-BE49-F238E27FC236}">
+                <a16:creationId xmlns:a16="http://schemas.microsoft.com/office/drawing/2014/main" id="{B523FD91-041D-423E-BD4C-95607DC857ED}"/>
+              </a:ext>
+            </a:extLst>
+          </p:cNvPr>
+          <p:cNvSpPr txBox="1"/>
+          <p:nvPr/>
+        </p:nvSpPr>
+        <p:spPr>
+          <a:xfrm>
+            <a:off x="1180123" y="2417861"/>
+            <a:ext cx="990977" cy="307777"/>
+          </a:xfrm>
+          <a:prstGeom prst="rect">
+            <a:avLst/>
+          </a:prstGeom>
+          <a:noFill/>
+        </p:spPr>
+        <p:txBody>
+          <a:bodyPr wrap="none" rtlCol="0">
+            <a:spAutoFit/>
+          </a:bodyPr>
+          <a:lstStyle/>
+          <a:p>
+            <a:r>
+              <a:rPr lang="fr-FR" dirty="0"/>
+              <a:t>Amandine</a:t>
+            </a:r>
           </a:p>
         </p:txBody>
       </p:sp>
@@ -8697,6 +8767,41 @@
           </a:p>
         </p:txBody>
       </p:sp>
+      <p:sp>
+        <p:nvSpPr>
+          <p:cNvPr id="4" name="ZoneTexte 3">
+            <a:extLst>
+              <a:ext uri="{FF2B5EF4-FFF2-40B4-BE49-F238E27FC236}">
+                <a16:creationId xmlns:a16="http://schemas.microsoft.com/office/drawing/2014/main" id="{1FB67A94-B083-4A26-8CEA-514DD08E5A3B}"/>
+              </a:ext>
+            </a:extLst>
+          </p:cNvPr>
+          <p:cNvSpPr txBox="1"/>
+          <p:nvPr/>
+        </p:nvSpPr>
+        <p:spPr>
+          <a:xfrm>
+            <a:off x="588184" y="1867877"/>
+            <a:ext cx="622286" cy="307777"/>
+          </a:xfrm>
+          <a:prstGeom prst="rect">
+            <a:avLst/>
+          </a:prstGeom>
+          <a:noFill/>
+        </p:spPr>
+        <p:txBody>
+          <a:bodyPr wrap="none" rtlCol="0">
+            <a:spAutoFit/>
+          </a:bodyPr>
+          <a:lstStyle/>
+          <a:p>
+            <a:r>
+              <a:rPr lang="fr-FR" dirty="0"/>
+              <a:t>Janet</a:t>
+            </a:r>
+          </a:p>
+        </p:txBody>
+      </p:sp>
     </p:spTree>
   </p:cSld>
   <p:clrMapOvr>
@@ -8950,6 +9055,41 @@
           </a:fontRef>
         </p:style>
       </p:cxnSp>
+      <p:sp>
+        <p:nvSpPr>
+          <p:cNvPr id="2" name="ZoneTexte 1">
+            <a:extLst>
+              <a:ext uri="{FF2B5EF4-FFF2-40B4-BE49-F238E27FC236}">
+                <a16:creationId xmlns:a16="http://schemas.microsoft.com/office/drawing/2014/main" id="{249740C1-4F17-4783-904E-86B4D7B2ACF9}"/>
+              </a:ext>
+            </a:extLst>
+          </p:cNvPr>
+          <p:cNvSpPr txBox="1"/>
+          <p:nvPr/>
+        </p:nvSpPr>
+        <p:spPr>
+          <a:xfrm>
+            <a:off x="347837" y="2430585"/>
+            <a:ext cx="622286" cy="307777"/>
+          </a:xfrm>
+          <a:prstGeom prst="rect">
+            <a:avLst/>
+          </a:prstGeom>
+          <a:noFill/>
+        </p:spPr>
+        <p:txBody>
+          <a:bodyPr wrap="none" rtlCol="0">
+            <a:spAutoFit/>
+          </a:bodyPr>
+          <a:lstStyle/>
+          <a:p>
+            <a:r>
+              <a:rPr lang="fr-FR" dirty="0"/>
+              <a:t>Janet</a:t>
+            </a:r>
+          </a:p>
+        </p:txBody>
+      </p:sp>
     </p:spTree>
   </p:cSld>
   <p:clrMapOvr>
@@ -9056,6 +9196,41 @@
               <a:t>Démonstration de l’application</a:t>
             </a:r>
             <a:endParaRPr dirty="0"/>
+          </a:p>
+        </p:txBody>
+      </p:sp>
+      <p:sp>
+        <p:nvSpPr>
+          <p:cNvPr id="2" name="ZoneTexte 1">
+            <a:extLst>
+              <a:ext uri="{FF2B5EF4-FFF2-40B4-BE49-F238E27FC236}">
+                <a16:creationId xmlns:a16="http://schemas.microsoft.com/office/drawing/2014/main" id="{9C4F47EA-5092-4D75-B104-3100966D056C}"/>
+              </a:ext>
+            </a:extLst>
+          </p:cNvPr>
+          <p:cNvSpPr txBox="1"/>
+          <p:nvPr/>
+        </p:nvSpPr>
+        <p:spPr>
+          <a:xfrm>
+            <a:off x="2844800" y="3118338"/>
+            <a:ext cx="990977" cy="307777"/>
+          </a:xfrm>
+          <a:prstGeom prst="rect">
+            <a:avLst/>
+          </a:prstGeom>
+          <a:noFill/>
+        </p:spPr>
+        <p:txBody>
+          <a:bodyPr wrap="none" rtlCol="0">
+            <a:spAutoFit/>
+          </a:bodyPr>
+          <a:lstStyle/>
+          <a:p>
+            <a:r>
+              <a:rPr lang="fr-FR" dirty="0"/>
+              <a:t>Amandine</a:t>
+            </a:r>
           </a:p>
         </p:txBody>
       </p:sp>
@@ -9162,7 +9337,7 @@
             </a:pPr>
             <a:r>
               <a:rPr lang="fr" dirty="0"/>
-              <a:t>60 sec</a:t>
+              <a:t>Janet</a:t>
             </a:r>
             <a:endParaRPr dirty="0"/>
           </a:p>
@@ -11332,10 +11507,10 @@
               <a:buNone/>
             </a:pPr>
             <a:r>
-              <a:rPr lang="fr"/>
-              <a:t>60 sec</a:t>
+              <a:rPr lang="fr" dirty="0"/>
+              <a:t>Janet</a:t>
             </a:r>
-            <a:endParaRPr/>
+            <a:endParaRPr dirty="0"/>
           </a:p>
         </p:txBody>
       </p:sp>
@@ -11502,6 +11677,41 @@
           </a:prstGeom>
         </p:spPr>
       </p:pic>
+      <p:sp>
+        <p:nvSpPr>
+          <p:cNvPr id="2" name="ZoneTexte 1">
+            <a:extLst>
+              <a:ext uri="{FF2B5EF4-FFF2-40B4-BE49-F238E27FC236}">
+                <a16:creationId xmlns:a16="http://schemas.microsoft.com/office/drawing/2014/main" id="{DB7B1094-FAD6-4C85-81B2-64E380C34A56}"/>
+              </a:ext>
+            </a:extLst>
+          </p:cNvPr>
+          <p:cNvSpPr txBox="1"/>
+          <p:nvPr/>
+        </p:nvSpPr>
+        <p:spPr>
+          <a:xfrm>
+            <a:off x="2844800" y="3118338"/>
+            <a:ext cx="2888932" cy="307777"/>
+          </a:xfrm>
+          <a:prstGeom prst="rect">
+            <a:avLst/>
+          </a:prstGeom>
+          <a:noFill/>
+        </p:spPr>
+        <p:txBody>
+          <a:bodyPr wrap="none" rtlCol="0">
+            <a:spAutoFit/>
+          </a:bodyPr>
+          <a:lstStyle/>
+          <a:p>
+            <a:r>
+              <a:rPr lang="fr-FR" dirty="0"/>
+              <a:t>Janet (à compléter par Amandine)</a:t>
+            </a:r>
+          </a:p>
+        </p:txBody>
+      </p:sp>
     </p:spTree>
   </p:cSld>
   <p:clrMapOvr>
@@ -11562,10 +11772,10 @@
               <a:buNone/>
             </a:pPr>
             <a:r>
-              <a:rPr lang="fr"/>
+              <a:rPr lang="fr" dirty="0"/>
               <a:t>Architecture</a:t>
             </a:r>
-            <a:endParaRPr/>
+            <a:endParaRPr dirty="0"/>
           </a:p>
         </p:txBody>
       </p:sp>
@@ -11645,6 +11855,41 @@
           </a:prstGeom>
         </p:spPr>
       </p:pic>
+      <p:sp>
+        <p:nvSpPr>
+          <p:cNvPr id="2" name="ZoneTexte 1">
+            <a:extLst>
+              <a:ext uri="{FF2B5EF4-FFF2-40B4-BE49-F238E27FC236}">
+                <a16:creationId xmlns:a16="http://schemas.microsoft.com/office/drawing/2014/main" id="{BDDA6E7E-6465-49C9-BA47-CD590170BB0F}"/>
+              </a:ext>
+            </a:extLst>
+          </p:cNvPr>
+          <p:cNvSpPr txBox="1"/>
+          <p:nvPr/>
+        </p:nvSpPr>
+        <p:spPr>
+          <a:xfrm>
+            <a:off x="1187938" y="2263973"/>
+            <a:ext cx="622286" cy="307777"/>
+          </a:xfrm>
+          <a:prstGeom prst="rect">
+            <a:avLst/>
+          </a:prstGeom>
+          <a:noFill/>
+        </p:spPr>
+        <p:txBody>
+          <a:bodyPr wrap="none" rtlCol="0">
+            <a:spAutoFit/>
+          </a:bodyPr>
+          <a:lstStyle/>
+          <a:p>
+            <a:r>
+              <a:rPr lang="fr-FR" dirty="0"/>
+              <a:t>Janet</a:t>
+            </a:r>
+          </a:p>
+        </p:txBody>
+      </p:sp>
     </p:spTree>
   </p:cSld>
   <p:clrMapOvr>

</xml_diff>